<commit_message>
java code in slides
</commit_message>
<xml_diff>
--- a/Documents/Slides.pptx
+++ b/Documents/Slides.pptx
@@ -296,7 +296,7 @@
                 <a:latin typeface="Calibri" pitchFamily="34" charset="0"/>
               </a:rPr>
               <a:pPr/>
-              <a:t>7/21/14</a:t>
+              <a:t>7/22/14</a:t>
             </a:fld>
             <a:endParaRPr lang="en-US" dirty="0">
               <a:latin typeface="Calibri" pitchFamily="34" charset="0"/>
@@ -509,7 +509,7 @@
             <a:fld id="{7C3FBCD4-166E-446F-AF18-7D4A0CF9AEF6}" type="datetimeFigureOut">
               <a:rPr lang="en-US" smtClean="0"/>
               <a:pPr/>
-              <a:t>7/21/14</a:t>
+              <a:t>7/22/14</a:t>
             </a:fld>
             <a:endParaRPr lang="en-US" dirty="0"/>
           </a:p>
@@ -913,7 +913,7 @@
             <a:fld id="{81331B57-0BE5-4F82-AA58-76F53EFF3ADA}" type="datetime8">
               <a:rPr lang="en-US" smtClean="0"/>
               <a:pPr/>
-              <a:t>7/21/14 20:33</a:t>
+              <a:t>7/22/14 21:49</a:t>
             </a:fld>
             <a:endParaRPr lang="en-US"/>
           </a:p>
@@ -1086,7 +1086,7 @@
             <a:fld id="{81331B57-0BE5-4F82-AA58-76F53EFF3ADA}" type="datetime8">
               <a:rPr lang="en-US" smtClean="0"/>
               <a:pPr/>
-              <a:t>7/21/14 20:33</a:t>
+              <a:t>7/22/14 21:49</a:t>
             </a:fld>
             <a:endParaRPr lang="en-US"/>
           </a:p>
@@ -1259,7 +1259,7 @@
             <a:fld id="{81331B57-0BE5-4F82-AA58-76F53EFF3ADA}" type="datetime8">
               <a:rPr lang="en-US" smtClean="0"/>
               <a:pPr/>
-              <a:t>7/21/14 20:33</a:t>
+              <a:t>7/22/14 21:49</a:t>
             </a:fld>
             <a:endParaRPr lang="en-US"/>
           </a:p>
@@ -1432,7 +1432,7 @@
             <a:fld id="{81331B57-0BE5-4F82-AA58-76F53EFF3ADA}" type="datetime8">
               <a:rPr lang="en-US" smtClean="0"/>
               <a:pPr/>
-              <a:t>7/21/14 20:33</a:t>
+              <a:t>7/22/14 21:49</a:t>
             </a:fld>
             <a:endParaRPr lang="en-US"/>
           </a:p>
@@ -1605,7 +1605,7 @@
             <a:fld id="{81331B57-0BE5-4F82-AA58-76F53EFF3ADA}" type="datetime8">
               <a:rPr lang="en-US" smtClean="0"/>
               <a:pPr/>
-              <a:t>7/21/14 20:33</a:t>
+              <a:t>7/22/14 21:49</a:t>
             </a:fld>
             <a:endParaRPr lang="en-US"/>
           </a:p>
@@ -2238,7 +2238,7 @@
             <a:fld id="{81331B57-0BE5-4F82-AA58-76F53EFF3ADA}" type="datetime8">
               <a:rPr lang="en-US" smtClean="0"/>
               <a:pPr/>
-              <a:t>7/21/14 20:33</a:t>
+              <a:t>7/22/14 21:49</a:t>
             </a:fld>
             <a:endParaRPr lang="en-US"/>
           </a:p>
@@ -2411,7 +2411,7 @@
             <a:fld id="{81331B57-0BE5-4F82-AA58-76F53EFF3ADA}" type="datetime8">
               <a:rPr lang="en-US" smtClean="0"/>
               <a:pPr/>
-              <a:t>7/21/14 20:33</a:t>
+              <a:t>7/22/14 21:49</a:t>
             </a:fld>
             <a:endParaRPr lang="en-US"/>
           </a:p>
@@ -4909,44 +4909,12 @@
           <a:lstStyle/>
           <a:p>
             <a:r>
-              <a:rPr lang="en-US" sz="3600" dirty="0">
+              <a:rPr lang="en-US" sz="3600" dirty="0" smtClean="0">
                 <a:solidFill>
                   <a:schemeClr val="accent1"/>
                 </a:solidFill>
               </a:rPr>
-              <a:t>If a home , auto and personal loan are taken out by </a:t>
-            </a:r>
-            <a:r>
-              <a:rPr lang="en-US" sz="3600" dirty="0" smtClean="0">
-                <a:solidFill>
-                  <a:schemeClr val="accent1"/>
-                </a:solidFill>
-              </a:rPr>
-              <a:t>Tom</a:t>
-            </a:r>
-            <a:r>
-              <a:rPr lang="en-US" sz="3600" dirty="0">
-                <a:solidFill>
-                  <a:schemeClr val="accent1"/>
-                </a:solidFill>
-              </a:rPr>
-              <a:t>, 3 versions of </a:t>
-            </a:r>
-            <a:r>
-              <a:rPr lang="en-US" sz="3600" dirty="0" smtClean="0">
-                <a:solidFill>
-                  <a:schemeClr val="accent1"/>
-                </a:solidFill>
-              </a:rPr>
-              <a:t>Tom </a:t>
-            </a:r>
-            <a:r>
-              <a:rPr lang="en-US" sz="3600" dirty="0">
-                <a:solidFill>
-                  <a:schemeClr val="accent1"/>
-                </a:solidFill>
-              </a:rPr>
-              <a:t>appear in the database.</a:t>
+              <a:t>If a home , auto and personal loan are taken out by Tom, 3 versions of Tom appear in the database.</a:t>
             </a:r>
             <a:endParaRPr lang="en-US" sz="3600" dirty="0"/>
           </a:p>
@@ -12092,60 +12060,676 @@
           <a:chExt cx="0" cy="0"/>
         </a:xfrm>
       </p:grpSpPr>
-      <p:pic>
-        <p:nvPicPr>
-          <p:cNvPr id="6" name="Picture 1"/>
-          <p:cNvPicPr>
-            <a:picLocks noChangeAspect="1" noChangeArrowheads="1"/>
-          </p:cNvPicPr>
+      <p:sp>
+        <p:nvSpPr>
+          <p:cNvPr id="3" name="TextBox 2"/>
+          <p:cNvSpPr txBox="1"/>
           <p:nvPr/>
-        </p:nvPicPr>
-        <p:blipFill>
-          <a:blip r:embed="rId3">
-            <a:extLst>
-              <a:ext uri="{28A0092B-C50C-407E-A947-70E740481C1C}">
-                <a14:useLocalDpi xmlns:a14="http://schemas.microsoft.com/office/drawing/2010/main" val="0"/>
-              </a:ext>
-            </a:extLst>
-          </a:blip>
-          <a:srcRect/>
-          <a:stretch>
-            <a:fillRect/>
-          </a:stretch>
-        </p:blipFill>
-        <p:spPr bwMode="auto">
+        </p:nvSpPr>
+        <p:spPr>
           <a:xfrm>
-            <a:off x="1078111" y="1639155"/>
-            <a:ext cx="6697266" cy="1945556"/>
+            <a:off x="42333" y="1136952"/>
+            <a:ext cx="9053286" cy="3323987"/>
           </a:xfrm>
           <a:prstGeom prst="rect">
             <a:avLst/>
           </a:prstGeom>
           <a:noFill/>
-          <a:ln>
-            <a:noFill/>
-          </a:ln>
-          <a:extLst>
-            <a:ext uri="{909E8E84-426E-40dd-AFC4-6F175D3DCCD1}">
-              <a14:hiddenFill xmlns:a14="http://schemas.microsoft.com/office/drawing/2010/main">
-                <a:solidFill>
-                  <a:srgbClr val="FFFFFF"/>
-                </a:solidFill>
-              </a14:hiddenFill>
-            </a:ext>
-            <a:ext uri="{91240B29-F687-4f45-9708-019B960494DF}">
-              <a14:hiddenLine xmlns:a14="http://schemas.microsoft.com/office/drawing/2010/main" w="12700" cap="flat">
-                <a:solidFill>
-                  <a:schemeClr val="tx1"/>
-                </a:solidFill>
-                <a:round/>
-                <a:headEnd/>
-                <a:tailEnd/>
-              </a14:hiddenLine>
-            </a:ext>
-          </a:extLst>
         </p:spPr>
-      </p:pic>
+        <p:txBody>
+          <a:bodyPr wrap="square" rtlCol="0">
+            <a:spAutoFit/>
+          </a:bodyPr>
+          <a:lstStyle/>
+          <a:p>
+            <a:r>
+              <a:rPr lang="en-US" sz="1400" dirty="0">
+                <a:solidFill>
+                  <a:srgbClr val="931968"/>
+                </a:solidFill>
+                <a:latin typeface="Monaco"/>
+                <a:ea typeface="Monaco"/>
+                <a:cs typeface="Monaco"/>
+              </a:rPr>
+              <a:t>public</a:t>
+            </a:r>
+            <a:r>
+              <a:rPr lang="en-US" sz="1400" dirty="0">
+                <a:solidFill>
+                  <a:srgbClr val="000000"/>
+                </a:solidFill>
+                <a:latin typeface="Monaco"/>
+                <a:ea typeface="Monaco"/>
+                <a:cs typeface="Monaco"/>
+              </a:rPr>
+              <a:t> </a:t>
+            </a:r>
+            <a:r>
+              <a:rPr lang="en-US" sz="1400" dirty="0">
+                <a:solidFill>
+                  <a:srgbClr val="931968"/>
+                </a:solidFill>
+                <a:latin typeface="Monaco"/>
+                <a:ea typeface="Monaco"/>
+                <a:cs typeface="Monaco"/>
+              </a:rPr>
+              <a:t>double</a:t>
+            </a:r>
+            <a:r>
+              <a:rPr lang="en-US" sz="1400" dirty="0">
+                <a:solidFill>
+                  <a:srgbClr val="000000"/>
+                </a:solidFill>
+                <a:latin typeface="Monaco"/>
+                <a:ea typeface="Monaco"/>
+                <a:cs typeface="Monaco"/>
+              </a:rPr>
+              <a:t> </a:t>
+            </a:r>
+            <a:r>
+              <a:rPr lang="en-US" sz="1400" dirty="0" err="1">
+                <a:solidFill>
+                  <a:srgbClr val="000000"/>
+                </a:solidFill>
+                <a:latin typeface="Monaco"/>
+                <a:ea typeface="Monaco"/>
+                <a:cs typeface="Monaco"/>
+              </a:rPr>
+              <a:t>calculateTotalMortgage</a:t>
+            </a:r>
+            <a:r>
+              <a:rPr lang="en-US" sz="1400" dirty="0">
+                <a:solidFill>
+                  <a:srgbClr val="000000"/>
+                </a:solidFill>
+                <a:latin typeface="Monaco"/>
+                <a:ea typeface="Monaco"/>
+                <a:cs typeface="Monaco"/>
+              </a:rPr>
+              <a:t>(String name, Connection con)</a:t>
+            </a:r>
+          </a:p>
+          <a:p>
+            <a:r>
+              <a:rPr lang="en-US" sz="1400" dirty="0">
+                <a:solidFill>
+                  <a:srgbClr val="000000"/>
+                </a:solidFill>
+                <a:latin typeface="Monaco"/>
+                <a:ea typeface="Monaco"/>
+                <a:cs typeface="Monaco"/>
+              </a:rPr>
+              <a:t>{</a:t>
+            </a:r>
+          </a:p>
+          <a:p>
+            <a:r>
+              <a:rPr lang="en-US" sz="1400" dirty="0">
+                <a:solidFill>
+                  <a:srgbClr val="000000"/>
+                </a:solidFill>
+                <a:latin typeface="Monaco"/>
+                <a:ea typeface="Monaco"/>
+                <a:cs typeface="Monaco"/>
+              </a:rPr>
+              <a:t>  Person p = </a:t>
+            </a:r>
+            <a:r>
+              <a:rPr lang="en-US" sz="1400" dirty="0" err="1">
+                <a:solidFill>
+                  <a:srgbClr val="000000"/>
+                </a:solidFill>
+                <a:latin typeface="Monaco"/>
+                <a:ea typeface="Monaco"/>
+                <a:cs typeface="Monaco"/>
+              </a:rPr>
+              <a:t>Person.loadPersonByName</a:t>
+            </a:r>
+            <a:r>
+              <a:rPr lang="en-US" sz="1400" dirty="0">
+                <a:solidFill>
+                  <a:srgbClr val="000000"/>
+                </a:solidFill>
+                <a:latin typeface="Monaco"/>
+                <a:ea typeface="Monaco"/>
+                <a:cs typeface="Monaco"/>
+              </a:rPr>
+              <a:t>(name, con);</a:t>
+            </a:r>
+          </a:p>
+          <a:p>
+            <a:r>
+              <a:rPr lang="en-US" sz="1400" dirty="0">
+                <a:solidFill>
+                  <a:srgbClr val="000000"/>
+                </a:solidFill>
+                <a:latin typeface="Monaco"/>
+                <a:ea typeface="Monaco"/>
+                <a:cs typeface="Monaco"/>
+              </a:rPr>
+              <a:t>  </a:t>
+            </a:r>
+            <a:r>
+              <a:rPr lang="en-US" sz="1400" dirty="0">
+                <a:solidFill>
+                  <a:srgbClr val="931968"/>
+                </a:solidFill>
+                <a:latin typeface="Monaco"/>
+                <a:ea typeface="Monaco"/>
+                <a:cs typeface="Monaco"/>
+              </a:rPr>
+              <a:t>double</a:t>
+            </a:r>
+            <a:r>
+              <a:rPr lang="en-US" sz="1400" dirty="0">
+                <a:solidFill>
+                  <a:srgbClr val="000000"/>
+                </a:solidFill>
+                <a:latin typeface="Monaco"/>
+                <a:ea typeface="Monaco"/>
+                <a:cs typeface="Monaco"/>
+              </a:rPr>
+              <a:t> total = 0.00;</a:t>
+            </a:r>
+          </a:p>
+          <a:p>
+            <a:r>
+              <a:rPr lang="en-US" sz="1400" dirty="0">
+                <a:solidFill>
+                  <a:srgbClr val="000000"/>
+                </a:solidFill>
+                <a:latin typeface="Monaco"/>
+                <a:ea typeface="Monaco"/>
+                <a:cs typeface="Monaco"/>
+              </a:rPr>
+              <a:t>  </a:t>
+            </a:r>
+            <a:r>
+              <a:rPr lang="en-US" sz="1400" dirty="0">
+                <a:solidFill>
+                  <a:srgbClr val="931968"/>
+                </a:solidFill>
+                <a:latin typeface="Monaco"/>
+                <a:ea typeface="Monaco"/>
+                <a:cs typeface="Monaco"/>
+              </a:rPr>
+              <a:t>if</a:t>
+            </a:r>
+            <a:r>
+              <a:rPr lang="en-US" sz="1400" dirty="0">
+                <a:solidFill>
+                  <a:srgbClr val="000000"/>
+                </a:solidFill>
+                <a:latin typeface="Monaco"/>
+                <a:ea typeface="Monaco"/>
+                <a:cs typeface="Monaco"/>
+              </a:rPr>
+              <a:t> (</a:t>
+            </a:r>
+            <a:r>
+              <a:rPr lang="en-US" sz="1400" dirty="0" err="1">
+                <a:solidFill>
+                  <a:srgbClr val="000000"/>
+                </a:solidFill>
+                <a:latin typeface="Monaco"/>
+                <a:ea typeface="Monaco"/>
+                <a:cs typeface="Monaco"/>
+              </a:rPr>
+              <a:t>p.getFinancalInformation</a:t>
+            </a:r>
+            <a:r>
+              <a:rPr lang="en-US" sz="1400" dirty="0">
+                <a:solidFill>
+                  <a:srgbClr val="000000"/>
+                </a:solidFill>
+                <a:latin typeface="Monaco"/>
+                <a:ea typeface="Monaco"/>
+                <a:cs typeface="Monaco"/>
+              </a:rPr>
+              <a:t>().</a:t>
+            </a:r>
+            <a:r>
+              <a:rPr lang="en-US" sz="1400" dirty="0" err="1">
+                <a:solidFill>
+                  <a:srgbClr val="000000"/>
+                </a:solidFill>
+                <a:latin typeface="Monaco"/>
+                <a:ea typeface="Monaco"/>
+                <a:cs typeface="Monaco"/>
+              </a:rPr>
+              <a:t>getHomeEquityLoan</a:t>
+            </a:r>
+            <a:r>
+              <a:rPr lang="en-US" sz="1400" dirty="0">
+                <a:solidFill>
+                  <a:srgbClr val="000000"/>
+                </a:solidFill>
+                <a:latin typeface="Monaco"/>
+                <a:ea typeface="Monaco"/>
+                <a:cs typeface="Monaco"/>
+              </a:rPr>
+              <a:t>() != </a:t>
+            </a:r>
+            <a:r>
+              <a:rPr lang="en-US" sz="1400" dirty="0">
+                <a:solidFill>
+                  <a:srgbClr val="931968"/>
+                </a:solidFill>
+                <a:latin typeface="Monaco"/>
+                <a:ea typeface="Monaco"/>
+                <a:cs typeface="Monaco"/>
+              </a:rPr>
+              <a:t>null</a:t>
+            </a:r>
+            <a:r>
+              <a:rPr lang="en-US" sz="1400" dirty="0">
+                <a:solidFill>
+                  <a:srgbClr val="000000"/>
+                </a:solidFill>
+                <a:latin typeface="Monaco"/>
+                <a:ea typeface="Monaco"/>
+                <a:cs typeface="Monaco"/>
+              </a:rPr>
+              <a:t>)</a:t>
+            </a:r>
+          </a:p>
+          <a:p>
+            <a:r>
+              <a:rPr lang="en-US" sz="1400" dirty="0">
+                <a:solidFill>
+                  <a:srgbClr val="000000"/>
+                </a:solidFill>
+                <a:latin typeface="Monaco"/>
+                <a:ea typeface="Monaco"/>
+                <a:cs typeface="Monaco"/>
+              </a:rPr>
+              <a:t>  {</a:t>
+            </a:r>
+          </a:p>
+          <a:p>
+            <a:r>
+              <a:rPr lang="en-US" sz="1400" dirty="0">
+                <a:solidFill>
+                  <a:srgbClr val="000000"/>
+                </a:solidFill>
+                <a:latin typeface="Monaco"/>
+                <a:ea typeface="Monaco"/>
+                <a:cs typeface="Monaco"/>
+              </a:rPr>
+              <a:t>    total = </a:t>
+            </a:r>
+            <a:r>
+              <a:rPr lang="en-US" sz="1400" dirty="0" err="1">
+                <a:solidFill>
+                  <a:srgbClr val="000000"/>
+                </a:solidFill>
+                <a:latin typeface="Monaco"/>
+                <a:ea typeface="Monaco"/>
+                <a:cs typeface="Monaco"/>
+              </a:rPr>
+              <a:t>p.getFinancalInformation</a:t>
+            </a:r>
+            <a:r>
+              <a:rPr lang="en-US" sz="1400" dirty="0">
+                <a:solidFill>
+                  <a:srgbClr val="000000"/>
+                </a:solidFill>
+                <a:latin typeface="Monaco"/>
+                <a:ea typeface="Monaco"/>
+                <a:cs typeface="Monaco"/>
+              </a:rPr>
+              <a:t>().</a:t>
+            </a:r>
+            <a:r>
+              <a:rPr lang="en-US" sz="1400" dirty="0" err="1">
+                <a:solidFill>
+                  <a:srgbClr val="000000"/>
+                </a:solidFill>
+                <a:latin typeface="Monaco"/>
+                <a:ea typeface="Monaco"/>
+                <a:cs typeface="Monaco"/>
+              </a:rPr>
+              <a:t>getHomeEquityLoan</a:t>
+            </a:r>
+            <a:r>
+              <a:rPr lang="en-US" sz="1400" dirty="0">
+                <a:solidFill>
+                  <a:srgbClr val="000000"/>
+                </a:solidFill>
+                <a:latin typeface="Monaco"/>
+                <a:ea typeface="Monaco"/>
+                <a:cs typeface="Monaco"/>
+              </a:rPr>
+              <a:t>()</a:t>
+            </a:r>
+          </a:p>
+          <a:p>
+            <a:r>
+              <a:rPr lang="en-US" sz="1400" dirty="0">
+                <a:solidFill>
+                  <a:srgbClr val="000000"/>
+                </a:solidFill>
+                <a:latin typeface="Monaco"/>
+                <a:ea typeface="Monaco"/>
+                <a:cs typeface="Monaco"/>
+              </a:rPr>
+              <a:t>        + </a:t>
+            </a:r>
+            <a:r>
+              <a:rPr lang="en-US" sz="1400" dirty="0" err="1">
+                <a:solidFill>
+                  <a:srgbClr val="000000"/>
+                </a:solidFill>
+                <a:latin typeface="Monaco"/>
+                <a:ea typeface="Monaco"/>
+                <a:cs typeface="Monaco"/>
+              </a:rPr>
+              <a:t>p.getFinancalInformation</a:t>
+            </a:r>
+            <a:r>
+              <a:rPr lang="en-US" sz="1400" dirty="0">
+                <a:solidFill>
+                  <a:srgbClr val="000000"/>
+                </a:solidFill>
+                <a:latin typeface="Monaco"/>
+                <a:ea typeface="Monaco"/>
+                <a:cs typeface="Monaco"/>
+              </a:rPr>
+              <a:t>().</a:t>
+            </a:r>
+            <a:r>
+              <a:rPr lang="en-US" sz="1400" dirty="0" err="1">
+                <a:solidFill>
+                  <a:srgbClr val="000000"/>
+                </a:solidFill>
+                <a:latin typeface="Monaco"/>
+                <a:ea typeface="Monaco"/>
+                <a:cs typeface="Monaco"/>
+              </a:rPr>
+              <a:t>getFirstMortagePayment</a:t>
+            </a:r>
+            <a:r>
+              <a:rPr lang="en-US" sz="1400" dirty="0">
+                <a:solidFill>
+                  <a:srgbClr val="000000"/>
+                </a:solidFill>
+                <a:latin typeface="Monaco"/>
+                <a:ea typeface="Monaco"/>
+                <a:cs typeface="Monaco"/>
+              </a:rPr>
+              <a:t>();</a:t>
+            </a:r>
+          </a:p>
+          <a:p>
+            <a:r>
+              <a:rPr lang="en-US" sz="1400" dirty="0">
+                <a:solidFill>
+                  <a:srgbClr val="000000"/>
+                </a:solidFill>
+                <a:latin typeface="Monaco"/>
+                <a:ea typeface="Monaco"/>
+                <a:cs typeface="Monaco"/>
+              </a:rPr>
+              <a:t>  }</a:t>
+            </a:r>
+          </a:p>
+          <a:p>
+            <a:r>
+              <a:rPr lang="en-US" sz="1400" dirty="0">
+                <a:solidFill>
+                  <a:srgbClr val="000000"/>
+                </a:solidFill>
+                <a:latin typeface="Monaco"/>
+                <a:ea typeface="Monaco"/>
+                <a:cs typeface="Monaco"/>
+              </a:rPr>
+              <a:t>  </a:t>
+            </a:r>
+            <a:r>
+              <a:rPr lang="en-US" sz="1400" dirty="0">
+                <a:solidFill>
+                  <a:srgbClr val="931968"/>
+                </a:solidFill>
+                <a:latin typeface="Monaco"/>
+                <a:ea typeface="Monaco"/>
+                <a:cs typeface="Monaco"/>
+              </a:rPr>
+              <a:t>else</a:t>
+            </a:r>
+            <a:r>
+              <a:rPr lang="en-US" sz="1400" dirty="0">
+                <a:solidFill>
+                  <a:srgbClr val="000000"/>
+                </a:solidFill>
+                <a:latin typeface="Monaco"/>
+                <a:ea typeface="Monaco"/>
+                <a:cs typeface="Monaco"/>
+              </a:rPr>
+              <a:t> </a:t>
+            </a:r>
+            <a:r>
+              <a:rPr lang="en-US" sz="1400" dirty="0">
+                <a:solidFill>
+                  <a:srgbClr val="931968"/>
+                </a:solidFill>
+                <a:latin typeface="Monaco"/>
+                <a:ea typeface="Monaco"/>
+                <a:cs typeface="Monaco"/>
+              </a:rPr>
+              <a:t>if</a:t>
+            </a:r>
+            <a:r>
+              <a:rPr lang="en-US" sz="1400" dirty="0">
+                <a:solidFill>
+                  <a:srgbClr val="000000"/>
+                </a:solidFill>
+                <a:latin typeface="Monaco"/>
+                <a:ea typeface="Monaco"/>
+                <a:cs typeface="Monaco"/>
+              </a:rPr>
+              <a:t> (</a:t>
+            </a:r>
+            <a:r>
+              <a:rPr lang="en-US" sz="1400" dirty="0" err="1">
+                <a:solidFill>
+                  <a:srgbClr val="000000"/>
+                </a:solidFill>
+                <a:latin typeface="Monaco"/>
+                <a:ea typeface="Monaco"/>
+                <a:cs typeface="Monaco"/>
+              </a:rPr>
+              <a:t>p.getFinancalInformation</a:t>
+            </a:r>
+            <a:r>
+              <a:rPr lang="en-US" sz="1400" dirty="0">
+                <a:solidFill>
+                  <a:srgbClr val="000000"/>
+                </a:solidFill>
+                <a:latin typeface="Monaco"/>
+                <a:ea typeface="Monaco"/>
+                <a:cs typeface="Monaco"/>
+              </a:rPr>
+              <a:t>().</a:t>
+            </a:r>
+            <a:r>
+              <a:rPr lang="en-US" sz="1400" dirty="0" err="1">
+                <a:solidFill>
+                  <a:srgbClr val="000000"/>
+                </a:solidFill>
+                <a:latin typeface="Monaco"/>
+                <a:ea typeface="Monaco"/>
+                <a:cs typeface="Monaco"/>
+              </a:rPr>
+              <a:t>getFirstMortagePayment</a:t>
+            </a:r>
+            <a:r>
+              <a:rPr lang="en-US" sz="1400" dirty="0">
+                <a:solidFill>
+                  <a:srgbClr val="000000"/>
+                </a:solidFill>
+                <a:latin typeface="Monaco"/>
+                <a:ea typeface="Monaco"/>
+                <a:cs typeface="Monaco"/>
+              </a:rPr>
+              <a:t>() != </a:t>
+            </a:r>
+            <a:r>
+              <a:rPr lang="en-US" sz="1400" dirty="0">
+                <a:solidFill>
+                  <a:srgbClr val="931968"/>
+                </a:solidFill>
+                <a:latin typeface="Monaco"/>
+                <a:ea typeface="Monaco"/>
+                <a:cs typeface="Monaco"/>
+              </a:rPr>
+              <a:t>null</a:t>
+            </a:r>
+            <a:r>
+              <a:rPr lang="en-US" sz="1400" dirty="0">
+                <a:solidFill>
+                  <a:srgbClr val="000000"/>
+                </a:solidFill>
+                <a:latin typeface="Monaco"/>
+                <a:ea typeface="Monaco"/>
+                <a:cs typeface="Monaco"/>
+              </a:rPr>
+              <a:t>)</a:t>
+            </a:r>
+          </a:p>
+          <a:p>
+            <a:r>
+              <a:rPr lang="en-US" sz="1400" dirty="0">
+                <a:solidFill>
+                  <a:srgbClr val="000000"/>
+                </a:solidFill>
+                <a:latin typeface="Monaco"/>
+                <a:ea typeface="Monaco"/>
+                <a:cs typeface="Monaco"/>
+              </a:rPr>
+              <a:t>  {</a:t>
+            </a:r>
+          </a:p>
+          <a:p>
+            <a:r>
+              <a:rPr lang="en-US" sz="1400" dirty="0">
+                <a:solidFill>
+                  <a:srgbClr val="000000"/>
+                </a:solidFill>
+                <a:latin typeface="Monaco"/>
+                <a:ea typeface="Monaco"/>
+                <a:cs typeface="Monaco"/>
+              </a:rPr>
+              <a:t>    total = </a:t>
+            </a:r>
+            <a:r>
+              <a:rPr lang="en-US" sz="1400" dirty="0" err="1">
+                <a:solidFill>
+                  <a:srgbClr val="000000"/>
+                </a:solidFill>
+                <a:latin typeface="Monaco"/>
+                <a:ea typeface="Monaco"/>
+                <a:cs typeface="Monaco"/>
+              </a:rPr>
+              <a:t>p.getFinancalInformation</a:t>
+            </a:r>
+            <a:r>
+              <a:rPr lang="en-US" sz="1400" dirty="0">
+                <a:solidFill>
+                  <a:srgbClr val="000000"/>
+                </a:solidFill>
+                <a:latin typeface="Monaco"/>
+                <a:ea typeface="Monaco"/>
+                <a:cs typeface="Monaco"/>
+              </a:rPr>
+              <a:t>().</a:t>
+            </a:r>
+            <a:r>
+              <a:rPr lang="en-US" sz="1400" dirty="0" err="1">
+                <a:solidFill>
+                  <a:srgbClr val="000000"/>
+                </a:solidFill>
+                <a:latin typeface="Monaco"/>
+                <a:ea typeface="Monaco"/>
+                <a:cs typeface="Monaco"/>
+              </a:rPr>
+              <a:t>getFirstMortagePayment</a:t>
+            </a:r>
+            <a:r>
+              <a:rPr lang="en-US" sz="1400" dirty="0">
+                <a:solidFill>
+                  <a:srgbClr val="000000"/>
+                </a:solidFill>
+                <a:latin typeface="Monaco"/>
+                <a:ea typeface="Monaco"/>
+                <a:cs typeface="Monaco"/>
+              </a:rPr>
+              <a:t>();</a:t>
+            </a:r>
+          </a:p>
+          <a:p>
+            <a:r>
+              <a:rPr lang="en-US" sz="1400" dirty="0">
+                <a:solidFill>
+                  <a:srgbClr val="000000"/>
+                </a:solidFill>
+                <a:latin typeface="Monaco"/>
+                <a:ea typeface="Monaco"/>
+                <a:cs typeface="Monaco"/>
+              </a:rPr>
+              <a:t>  }</a:t>
+            </a:r>
+          </a:p>
+          <a:p>
+            <a:r>
+              <a:rPr lang="en-US" sz="1400" dirty="0">
+                <a:solidFill>
+                  <a:srgbClr val="000000"/>
+                </a:solidFill>
+                <a:latin typeface="Monaco"/>
+                <a:ea typeface="Monaco"/>
+                <a:cs typeface="Monaco"/>
+              </a:rPr>
+              <a:t>  </a:t>
+            </a:r>
+            <a:r>
+              <a:rPr lang="en-US" sz="1400" dirty="0">
+                <a:solidFill>
+                  <a:srgbClr val="931968"/>
+                </a:solidFill>
+                <a:latin typeface="Monaco"/>
+                <a:ea typeface="Monaco"/>
+                <a:cs typeface="Monaco"/>
+              </a:rPr>
+              <a:t>return</a:t>
+            </a:r>
+            <a:r>
+              <a:rPr lang="en-US" sz="1400" dirty="0">
+                <a:solidFill>
+                  <a:srgbClr val="000000"/>
+                </a:solidFill>
+                <a:latin typeface="Monaco"/>
+                <a:ea typeface="Monaco"/>
+                <a:cs typeface="Monaco"/>
+              </a:rPr>
+              <a:t> total;</a:t>
+            </a:r>
+          </a:p>
+          <a:p>
+            <a:r>
+              <a:rPr lang="en-US" sz="1400" dirty="0">
+                <a:solidFill>
+                  <a:srgbClr val="000000"/>
+                </a:solidFill>
+                <a:latin typeface="Monaco"/>
+                <a:ea typeface="Monaco"/>
+                <a:cs typeface="Monaco"/>
+              </a:rPr>
+              <a:t>}</a:t>
+            </a:r>
+            <a:endParaRPr lang="en-US" sz="1400" dirty="0"/>
+          </a:p>
+        </p:txBody>
+      </p:sp>
       <p:sp>
         <p:nvSpPr>
           <p:cNvPr id="7" name="Rectangle 2"/>
@@ -12156,8 +12740,8 @@
         </p:nvSpPr>
         <p:spPr bwMode="auto">
           <a:xfrm>
-            <a:off x="1377255" y="1937183"/>
-            <a:ext cx="3571875" cy="120551"/>
+            <a:off x="318921" y="1622707"/>
+            <a:ext cx="4954603" cy="215769"/>
           </a:xfrm>
           <a:prstGeom prst="rect">
             <a:avLst/>
@@ -12197,8 +12781,8 @@
         </p:nvSpPr>
         <p:spPr bwMode="auto">
           <a:xfrm>
-            <a:off x="1712119" y="2077826"/>
-            <a:ext cx="3554016" cy="120551"/>
+            <a:off x="768048" y="2044095"/>
+            <a:ext cx="4922761" cy="205620"/>
           </a:xfrm>
           <a:prstGeom prst="rect">
             <a:avLst/>
@@ -12238,8 +12822,8 @@
         </p:nvSpPr>
         <p:spPr bwMode="auto">
           <a:xfrm>
-            <a:off x="2203252" y="2352413"/>
-            <a:ext cx="3571875" cy="120551"/>
+            <a:off x="1362633" y="2467429"/>
+            <a:ext cx="4963177" cy="199571"/>
           </a:xfrm>
           <a:prstGeom prst="rect">
             <a:avLst/>
@@ -12279,8 +12863,8 @@
         </p:nvSpPr>
         <p:spPr bwMode="auto">
           <a:xfrm>
-            <a:off x="2203251" y="2493056"/>
-            <a:ext cx="3929063" cy="120551"/>
+            <a:off x="1185333" y="2697238"/>
+            <a:ext cx="5545667" cy="199572"/>
           </a:xfrm>
           <a:prstGeom prst="rect">
             <a:avLst/>
@@ -12320,8 +12904,8 @@
         </p:nvSpPr>
         <p:spPr bwMode="auto">
           <a:xfrm>
-            <a:off x="1703189" y="2767644"/>
-            <a:ext cx="3929063" cy="120551"/>
+            <a:off x="1291951" y="3106311"/>
+            <a:ext cx="5451144" cy="238022"/>
           </a:xfrm>
           <a:prstGeom prst="rect">
             <a:avLst/>
@@ -12361,8 +12945,8 @@
         </p:nvSpPr>
         <p:spPr bwMode="auto">
           <a:xfrm>
-            <a:off x="2203251" y="3028837"/>
-            <a:ext cx="3929063" cy="120551"/>
+            <a:off x="1398917" y="3536837"/>
+            <a:ext cx="5549797" cy="218734"/>
           </a:xfrm>
           <a:prstGeom prst="rect">
             <a:avLst/>
@@ -12733,60 +13317,756 @@
           <a:chExt cx="0" cy="0"/>
         </a:xfrm>
       </p:grpSpPr>
-      <p:pic>
-        <p:nvPicPr>
-          <p:cNvPr id="9" name="Picture 1"/>
-          <p:cNvPicPr>
-            <a:picLocks noChangeAspect="1" noChangeArrowheads="1"/>
-          </p:cNvPicPr>
+      <p:sp>
+        <p:nvSpPr>
+          <p:cNvPr id="6" name="TextBox 5"/>
+          <p:cNvSpPr txBox="1"/>
           <p:nvPr/>
-        </p:nvPicPr>
-        <p:blipFill>
-          <a:blip r:embed="rId3">
-            <a:extLst>
-              <a:ext uri="{28A0092B-C50C-407E-A947-70E740481C1C}">
-                <a14:useLocalDpi xmlns:a14="http://schemas.microsoft.com/office/drawing/2010/main" val="0"/>
-              </a:ext>
-            </a:extLst>
-          </a:blip>
-          <a:srcRect/>
-          <a:stretch>
-            <a:fillRect/>
-          </a:stretch>
-        </p:blipFill>
-        <p:spPr bwMode="auto">
+        </p:nvSpPr>
+        <p:spPr>
           <a:xfrm>
-            <a:off x="1202531" y="1379636"/>
-            <a:ext cx="6920508" cy="2779365"/>
+            <a:off x="0" y="839943"/>
+            <a:ext cx="9143999" cy="3970318"/>
           </a:xfrm>
           <a:prstGeom prst="rect">
             <a:avLst/>
           </a:prstGeom>
           <a:noFill/>
-          <a:ln>
-            <a:noFill/>
-          </a:ln>
-          <a:extLst>
-            <a:ext uri="{909E8E84-426E-40dd-AFC4-6F175D3DCCD1}">
-              <a14:hiddenFill xmlns:a14="http://schemas.microsoft.com/office/drawing/2010/main">
-                <a:solidFill>
-                  <a:srgbClr val="FFFFFF"/>
-                </a:solidFill>
-              </a14:hiddenFill>
-            </a:ext>
-            <a:ext uri="{91240B29-F687-4f45-9708-019B960494DF}">
-              <a14:hiddenLine xmlns:a14="http://schemas.microsoft.com/office/drawing/2010/main" w="12700" cap="flat">
-                <a:solidFill>
-                  <a:schemeClr val="tx1"/>
-                </a:solidFill>
-                <a:round/>
-                <a:headEnd/>
-                <a:tailEnd/>
-              </a14:hiddenLine>
-            </a:ext>
-          </a:extLst>
         </p:spPr>
-      </p:pic>
+        <p:txBody>
+          <a:bodyPr wrap="square" rtlCol="0">
+            <a:spAutoFit/>
+          </a:bodyPr>
+          <a:lstStyle/>
+          <a:p>
+            <a:r>
+              <a:rPr lang="en-US" sz="1400" dirty="0">
+                <a:solidFill>
+                  <a:srgbClr val="931968"/>
+                </a:solidFill>
+                <a:latin typeface="Monaco"/>
+                <a:ea typeface="Monaco"/>
+                <a:cs typeface="Monaco"/>
+              </a:rPr>
+              <a:t>public</a:t>
+            </a:r>
+            <a:r>
+              <a:rPr lang="en-US" sz="1400" dirty="0">
+                <a:solidFill>
+                  <a:srgbClr val="000000"/>
+                </a:solidFill>
+                <a:latin typeface="Monaco"/>
+                <a:ea typeface="Monaco"/>
+                <a:cs typeface="Monaco"/>
+              </a:rPr>
+              <a:t> </a:t>
+            </a:r>
+            <a:r>
+              <a:rPr lang="en-US" sz="1400" dirty="0">
+                <a:solidFill>
+                  <a:srgbClr val="931968"/>
+                </a:solidFill>
+                <a:latin typeface="Monaco"/>
+                <a:ea typeface="Monaco"/>
+                <a:cs typeface="Monaco"/>
+              </a:rPr>
+              <a:t>double</a:t>
+            </a:r>
+            <a:r>
+              <a:rPr lang="en-US" sz="1400" dirty="0">
+                <a:solidFill>
+                  <a:srgbClr val="000000"/>
+                </a:solidFill>
+                <a:latin typeface="Monaco"/>
+                <a:ea typeface="Monaco"/>
+                <a:cs typeface="Monaco"/>
+              </a:rPr>
+              <a:t> </a:t>
+            </a:r>
+            <a:r>
+              <a:rPr lang="en-US" sz="1400" dirty="0" err="1">
+                <a:solidFill>
+                  <a:srgbClr val="000000"/>
+                </a:solidFill>
+                <a:latin typeface="Monaco"/>
+                <a:ea typeface="Monaco"/>
+                <a:cs typeface="Monaco"/>
+              </a:rPr>
+              <a:t>calculateTotalMortgage</a:t>
+            </a:r>
+            <a:r>
+              <a:rPr lang="en-US" sz="1400" dirty="0">
+                <a:solidFill>
+                  <a:srgbClr val="000000"/>
+                </a:solidFill>
+                <a:latin typeface="Monaco"/>
+                <a:ea typeface="Monaco"/>
+                <a:cs typeface="Monaco"/>
+              </a:rPr>
+              <a:t>(String name, Connection con)</a:t>
+            </a:r>
+          </a:p>
+          <a:p>
+            <a:r>
+              <a:rPr lang="en-US" sz="1400" dirty="0">
+                <a:solidFill>
+                  <a:srgbClr val="000000"/>
+                </a:solidFill>
+                <a:latin typeface="Monaco"/>
+                <a:ea typeface="Monaco"/>
+                <a:cs typeface="Monaco"/>
+              </a:rPr>
+              <a:t>{</a:t>
+            </a:r>
+          </a:p>
+          <a:p>
+            <a:r>
+              <a:rPr lang="en-US" sz="1400" dirty="0">
+                <a:solidFill>
+                  <a:srgbClr val="000000"/>
+                </a:solidFill>
+                <a:latin typeface="Monaco"/>
+                <a:ea typeface="Monaco"/>
+                <a:cs typeface="Monaco"/>
+              </a:rPr>
+              <a:t>  Person p = </a:t>
+            </a:r>
+            <a:r>
+              <a:rPr lang="en-US" sz="1400" dirty="0" err="1">
+                <a:solidFill>
+                  <a:srgbClr val="000000"/>
+                </a:solidFill>
+                <a:latin typeface="Monaco"/>
+                <a:ea typeface="Monaco"/>
+                <a:cs typeface="Monaco"/>
+              </a:rPr>
+              <a:t>Person.loadPersonByName</a:t>
+            </a:r>
+            <a:r>
+              <a:rPr lang="en-US" sz="1400" dirty="0">
+                <a:solidFill>
+                  <a:srgbClr val="000000"/>
+                </a:solidFill>
+                <a:latin typeface="Monaco"/>
+                <a:ea typeface="Monaco"/>
+                <a:cs typeface="Monaco"/>
+              </a:rPr>
+              <a:t>(name, con);</a:t>
+            </a:r>
+          </a:p>
+          <a:p>
+            <a:r>
+              <a:rPr lang="en-US" sz="1400" dirty="0">
+                <a:solidFill>
+                  <a:srgbClr val="000000"/>
+                </a:solidFill>
+                <a:latin typeface="Monaco"/>
+                <a:ea typeface="Monaco"/>
+                <a:cs typeface="Monaco"/>
+              </a:rPr>
+              <a:t>  Double </a:t>
+            </a:r>
+            <a:r>
+              <a:rPr lang="en-US" sz="1400" dirty="0" err="1">
+                <a:solidFill>
+                  <a:srgbClr val="000000"/>
+                </a:solidFill>
+                <a:latin typeface="Monaco"/>
+                <a:ea typeface="Monaco"/>
+                <a:cs typeface="Monaco"/>
+              </a:rPr>
+              <a:t>homeEquityLoan</a:t>
+            </a:r>
+            <a:r>
+              <a:rPr lang="en-US" sz="1400" dirty="0">
+                <a:solidFill>
+                  <a:srgbClr val="000000"/>
+                </a:solidFill>
+                <a:latin typeface="Monaco"/>
+                <a:ea typeface="Monaco"/>
+                <a:cs typeface="Monaco"/>
+              </a:rPr>
+              <a:t> = </a:t>
+            </a:r>
+            <a:r>
+              <a:rPr lang="en-US" sz="1400" dirty="0" err="1">
+                <a:solidFill>
+                  <a:srgbClr val="000000"/>
+                </a:solidFill>
+                <a:latin typeface="Monaco"/>
+                <a:ea typeface="Monaco"/>
+                <a:cs typeface="Monaco"/>
+              </a:rPr>
+              <a:t>p.getFinancalInformation</a:t>
+            </a:r>
+            <a:r>
+              <a:rPr lang="en-US" sz="1400" dirty="0">
+                <a:solidFill>
+                  <a:srgbClr val="000000"/>
+                </a:solidFill>
+                <a:latin typeface="Monaco"/>
+                <a:ea typeface="Monaco"/>
+                <a:cs typeface="Monaco"/>
+              </a:rPr>
+              <a:t>().</a:t>
+            </a:r>
+            <a:r>
+              <a:rPr lang="en-US" sz="1400" dirty="0" err="1">
+                <a:solidFill>
+                  <a:srgbClr val="000000"/>
+                </a:solidFill>
+                <a:latin typeface="Monaco"/>
+                <a:ea typeface="Monaco"/>
+                <a:cs typeface="Monaco"/>
+              </a:rPr>
+              <a:t>getHomeEquityLoan</a:t>
+            </a:r>
+            <a:r>
+              <a:rPr lang="en-US" sz="1400" dirty="0">
+                <a:solidFill>
+                  <a:srgbClr val="000000"/>
+                </a:solidFill>
+                <a:latin typeface="Monaco"/>
+                <a:ea typeface="Monaco"/>
+                <a:cs typeface="Monaco"/>
+              </a:rPr>
+              <a:t>();</a:t>
+            </a:r>
+          </a:p>
+          <a:p>
+            <a:r>
+              <a:rPr lang="en-US" sz="1400" dirty="0">
+                <a:solidFill>
+                  <a:srgbClr val="000000"/>
+                </a:solidFill>
+                <a:latin typeface="Monaco"/>
+                <a:ea typeface="Monaco"/>
+                <a:cs typeface="Monaco"/>
+              </a:rPr>
+              <a:t>  Double </a:t>
+            </a:r>
+            <a:r>
+              <a:rPr lang="en-US" sz="1400" dirty="0" err="1">
+                <a:solidFill>
+                  <a:srgbClr val="000000"/>
+                </a:solidFill>
+                <a:latin typeface="Monaco"/>
+                <a:ea typeface="Monaco"/>
+                <a:cs typeface="Monaco"/>
+              </a:rPr>
+              <a:t>firstMortagePayment</a:t>
+            </a:r>
+            <a:r>
+              <a:rPr lang="en-US" sz="1400" dirty="0">
+                <a:solidFill>
+                  <a:srgbClr val="000000"/>
+                </a:solidFill>
+                <a:latin typeface="Monaco"/>
+                <a:ea typeface="Monaco"/>
+                <a:cs typeface="Monaco"/>
+              </a:rPr>
+              <a:t> </a:t>
+            </a:r>
+            <a:r>
+              <a:rPr lang="en-US" sz="1400" dirty="0" smtClean="0">
+                <a:solidFill>
+                  <a:srgbClr val="000000"/>
+                </a:solidFill>
+                <a:latin typeface="Monaco"/>
+                <a:ea typeface="Monaco"/>
+                <a:cs typeface="Monaco"/>
+              </a:rPr>
+              <a:t>=</a:t>
+            </a:r>
+            <a:r>
+              <a:rPr lang="en-US" sz="1400" dirty="0" err="1" smtClean="0">
+                <a:solidFill>
+                  <a:srgbClr val="000000"/>
+                </a:solidFill>
+                <a:latin typeface="Monaco"/>
+                <a:ea typeface="Monaco"/>
+                <a:cs typeface="Monaco"/>
+              </a:rPr>
+              <a:t>p.getFinancalInformation</a:t>
+            </a:r>
+            <a:r>
+              <a:rPr lang="en-US" sz="1400" dirty="0">
+                <a:solidFill>
+                  <a:srgbClr val="000000"/>
+                </a:solidFill>
+                <a:latin typeface="Monaco"/>
+                <a:ea typeface="Monaco"/>
+                <a:cs typeface="Monaco"/>
+              </a:rPr>
+              <a:t>().</a:t>
+            </a:r>
+            <a:r>
+              <a:rPr lang="en-US" sz="1400" dirty="0" err="1">
+                <a:solidFill>
+                  <a:srgbClr val="000000"/>
+                </a:solidFill>
+                <a:latin typeface="Monaco"/>
+                <a:ea typeface="Monaco"/>
+                <a:cs typeface="Monaco"/>
+              </a:rPr>
+              <a:t>getFirstMortagePayment</a:t>
+            </a:r>
+            <a:r>
+              <a:rPr lang="en-US" sz="1400" dirty="0">
+                <a:solidFill>
+                  <a:srgbClr val="000000"/>
+                </a:solidFill>
+                <a:latin typeface="Monaco"/>
+                <a:ea typeface="Monaco"/>
+                <a:cs typeface="Monaco"/>
+              </a:rPr>
+              <a:t>();</a:t>
+            </a:r>
+          </a:p>
+          <a:p>
+            <a:r>
+              <a:rPr lang="en-US" sz="1400" dirty="0">
+                <a:solidFill>
+                  <a:srgbClr val="000000"/>
+                </a:solidFill>
+                <a:latin typeface="Monaco"/>
+                <a:ea typeface="Monaco"/>
+                <a:cs typeface="Monaco"/>
+              </a:rPr>
+              <a:t>  </a:t>
+            </a:r>
+          </a:p>
+          <a:p>
+            <a:r>
+              <a:rPr lang="en-US" sz="1400" dirty="0">
+                <a:solidFill>
+                  <a:srgbClr val="000000"/>
+                </a:solidFill>
+                <a:latin typeface="Monaco"/>
+                <a:ea typeface="Monaco"/>
+                <a:cs typeface="Monaco"/>
+              </a:rPr>
+              <a:t>  </a:t>
+            </a:r>
+            <a:r>
+              <a:rPr lang="en-US" sz="1400" dirty="0">
+                <a:solidFill>
+                  <a:srgbClr val="931968"/>
+                </a:solidFill>
+                <a:latin typeface="Monaco"/>
+                <a:ea typeface="Monaco"/>
+                <a:cs typeface="Monaco"/>
+              </a:rPr>
+              <a:t>double</a:t>
+            </a:r>
+            <a:r>
+              <a:rPr lang="en-US" sz="1400" dirty="0">
+                <a:solidFill>
+                  <a:srgbClr val="000000"/>
+                </a:solidFill>
+                <a:latin typeface="Monaco"/>
+                <a:ea typeface="Monaco"/>
+                <a:cs typeface="Monaco"/>
+              </a:rPr>
+              <a:t> total = 0.00;</a:t>
+            </a:r>
+          </a:p>
+          <a:p>
+            <a:endParaRPr lang="en-US" sz="1400" dirty="0">
+              <a:solidFill>
+                <a:srgbClr val="000000"/>
+              </a:solidFill>
+              <a:latin typeface="Monaco"/>
+              <a:ea typeface="Monaco"/>
+              <a:cs typeface="Monaco"/>
+            </a:endParaRPr>
+          </a:p>
+          <a:p>
+            <a:r>
+              <a:rPr lang="en-US" sz="1400" dirty="0">
+                <a:solidFill>
+                  <a:srgbClr val="000000"/>
+                </a:solidFill>
+                <a:latin typeface="Monaco"/>
+                <a:ea typeface="Monaco"/>
+                <a:cs typeface="Monaco"/>
+              </a:rPr>
+              <a:t>  </a:t>
+            </a:r>
+            <a:r>
+              <a:rPr lang="en-US" sz="1400" dirty="0">
+                <a:solidFill>
+                  <a:srgbClr val="931968"/>
+                </a:solidFill>
+                <a:latin typeface="Monaco"/>
+                <a:ea typeface="Monaco"/>
+                <a:cs typeface="Monaco"/>
+              </a:rPr>
+              <a:t>if</a:t>
+            </a:r>
+            <a:r>
+              <a:rPr lang="en-US" sz="1400" dirty="0">
+                <a:solidFill>
+                  <a:srgbClr val="000000"/>
+                </a:solidFill>
+                <a:latin typeface="Monaco"/>
+                <a:ea typeface="Monaco"/>
+                <a:cs typeface="Monaco"/>
+              </a:rPr>
+              <a:t> (</a:t>
+            </a:r>
+            <a:r>
+              <a:rPr lang="en-US" sz="1400" dirty="0" err="1">
+                <a:solidFill>
+                  <a:srgbClr val="000000"/>
+                </a:solidFill>
+                <a:latin typeface="Monaco"/>
+                <a:ea typeface="Monaco"/>
+                <a:cs typeface="Monaco"/>
+              </a:rPr>
+              <a:t>homeEquityLoan</a:t>
+            </a:r>
+            <a:r>
+              <a:rPr lang="en-US" sz="1400" dirty="0">
+                <a:solidFill>
+                  <a:srgbClr val="000000"/>
+                </a:solidFill>
+                <a:latin typeface="Monaco"/>
+                <a:ea typeface="Monaco"/>
+                <a:cs typeface="Monaco"/>
+              </a:rPr>
+              <a:t> != </a:t>
+            </a:r>
+            <a:r>
+              <a:rPr lang="en-US" sz="1400" dirty="0">
+                <a:solidFill>
+                  <a:srgbClr val="931968"/>
+                </a:solidFill>
+                <a:latin typeface="Monaco"/>
+                <a:ea typeface="Monaco"/>
+                <a:cs typeface="Monaco"/>
+              </a:rPr>
+              <a:t>null</a:t>
+            </a:r>
+            <a:r>
+              <a:rPr lang="en-US" sz="1400" dirty="0">
+                <a:solidFill>
+                  <a:srgbClr val="000000"/>
+                </a:solidFill>
+                <a:latin typeface="Monaco"/>
+                <a:ea typeface="Monaco"/>
+                <a:cs typeface="Monaco"/>
+              </a:rPr>
+              <a:t>)</a:t>
+            </a:r>
+          </a:p>
+          <a:p>
+            <a:r>
+              <a:rPr lang="en-US" sz="1400" dirty="0">
+                <a:solidFill>
+                  <a:srgbClr val="000000"/>
+                </a:solidFill>
+                <a:latin typeface="Monaco"/>
+                <a:ea typeface="Monaco"/>
+                <a:cs typeface="Monaco"/>
+              </a:rPr>
+              <a:t>  {</a:t>
+            </a:r>
+          </a:p>
+          <a:p>
+            <a:r>
+              <a:rPr lang="en-US" sz="1400" dirty="0">
+                <a:solidFill>
+                  <a:srgbClr val="000000"/>
+                </a:solidFill>
+                <a:latin typeface="Monaco"/>
+                <a:ea typeface="Monaco"/>
+                <a:cs typeface="Monaco"/>
+              </a:rPr>
+              <a:t>    total = </a:t>
+            </a:r>
+            <a:r>
+              <a:rPr lang="en-US" sz="1400" dirty="0" err="1" smtClean="0">
+                <a:solidFill>
+                  <a:srgbClr val="000000"/>
+                </a:solidFill>
+                <a:latin typeface="Monaco"/>
+                <a:ea typeface="Monaco"/>
+                <a:cs typeface="Monaco"/>
+              </a:rPr>
+              <a:t>homeEquityLoan</a:t>
+            </a:r>
+            <a:r>
+              <a:rPr lang="en-US" sz="1400" dirty="0" smtClean="0">
+                <a:solidFill>
+                  <a:srgbClr val="000000"/>
+                </a:solidFill>
+                <a:latin typeface="Monaco"/>
+                <a:ea typeface="Monaco"/>
+                <a:cs typeface="Monaco"/>
+              </a:rPr>
+              <a:t> </a:t>
+            </a:r>
+            <a:r>
+              <a:rPr lang="en-US" sz="1400" dirty="0">
+                <a:solidFill>
+                  <a:srgbClr val="000000"/>
+                </a:solidFill>
+                <a:latin typeface="Monaco"/>
+                <a:ea typeface="Monaco"/>
+                <a:cs typeface="Monaco"/>
+              </a:rPr>
+              <a:t>+ </a:t>
+            </a:r>
+            <a:r>
+              <a:rPr lang="en-US" sz="1400" dirty="0" err="1">
+                <a:solidFill>
+                  <a:srgbClr val="000000"/>
+                </a:solidFill>
+                <a:latin typeface="Monaco"/>
+                <a:ea typeface="Monaco"/>
+                <a:cs typeface="Monaco"/>
+              </a:rPr>
+              <a:t>firstMortagePayment</a:t>
+            </a:r>
+            <a:r>
+              <a:rPr lang="en-US" sz="1400" dirty="0">
+                <a:solidFill>
+                  <a:srgbClr val="000000"/>
+                </a:solidFill>
+                <a:latin typeface="Monaco"/>
+                <a:ea typeface="Monaco"/>
+                <a:cs typeface="Monaco"/>
+              </a:rPr>
+              <a:t>;</a:t>
+            </a:r>
+          </a:p>
+          <a:p>
+            <a:r>
+              <a:rPr lang="en-US" sz="1400" dirty="0">
+                <a:solidFill>
+                  <a:srgbClr val="000000"/>
+                </a:solidFill>
+                <a:latin typeface="Monaco"/>
+                <a:ea typeface="Monaco"/>
+                <a:cs typeface="Monaco"/>
+              </a:rPr>
+              <a:t>  }</a:t>
+            </a:r>
+          </a:p>
+          <a:p>
+            <a:r>
+              <a:rPr lang="en-US" sz="1400" dirty="0">
+                <a:solidFill>
+                  <a:srgbClr val="000000"/>
+                </a:solidFill>
+                <a:latin typeface="Monaco"/>
+                <a:ea typeface="Monaco"/>
+                <a:cs typeface="Monaco"/>
+              </a:rPr>
+              <a:t>  </a:t>
+            </a:r>
+            <a:r>
+              <a:rPr lang="en-US" sz="1400" dirty="0">
+                <a:solidFill>
+                  <a:srgbClr val="931968"/>
+                </a:solidFill>
+                <a:latin typeface="Monaco"/>
+                <a:ea typeface="Monaco"/>
+                <a:cs typeface="Monaco"/>
+              </a:rPr>
+              <a:t>else</a:t>
+            </a:r>
+            <a:r>
+              <a:rPr lang="en-US" sz="1400" dirty="0">
+                <a:solidFill>
+                  <a:srgbClr val="000000"/>
+                </a:solidFill>
+                <a:latin typeface="Monaco"/>
+                <a:ea typeface="Monaco"/>
+                <a:cs typeface="Monaco"/>
+              </a:rPr>
+              <a:t> </a:t>
+            </a:r>
+            <a:r>
+              <a:rPr lang="en-US" sz="1400" dirty="0">
+                <a:solidFill>
+                  <a:srgbClr val="931968"/>
+                </a:solidFill>
+                <a:latin typeface="Monaco"/>
+                <a:ea typeface="Monaco"/>
+                <a:cs typeface="Monaco"/>
+              </a:rPr>
+              <a:t>if</a:t>
+            </a:r>
+            <a:r>
+              <a:rPr lang="en-US" sz="1400" dirty="0">
+                <a:solidFill>
+                  <a:srgbClr val="000000"/>
+                </a:solidFill>
+                <a:latin typeface="Monaco"/>
+                <a:ea typeface="Monaco"/>
+                <a:cs typeface="Monaco"/>
+              </a:rPr>
+              <a:t> (</a:t>
+            </a:r>
+            <a:r>
+              <a:rPr lang="en-US" sz="1400" dirty="0" err="1">
+                <a:solidFill>
+                  <a:srgbClr val="000000"/>
+                </a:solidFill>
+                <a:latin typeface="Monaco"/>
+                <a:ea typeface="Monaco"/>
+                <a:cs typeface="Monaco"/>
+              </a:rPr>
+              <a:t>firstMortagePayment</a:t>
+            </a:r>
+            <a:r>
+              <a:rPr lang="en-US" sz="1400" dirty="0">
+                <a:solidFill>
+                  <a:srgbClr val="000000"/>
+                </a:solidFill>
+                <a:latin typeface="Monaco"/>
+                <a:ea typeface="Monaco"/>
+                <a:cs typeface="Monaco"/>
+              </a:rPr>
+              <a:t> != </a:t>
+            </a:r>
+            <a:r>
+              <a:rPr lang="en-US" sz="1400" dirty="0">
+                <a:solidFill>
+                  <a:srgbClr val="931968"/>
+                </a:solidFill>
+                <a:latin typeface="Monaco"/>
+                <a:ea typeface="Monaco"/>
+                <a:cs typeface="Monaco"/>
+              </a:rPr>
+              <a:t>null</a:t>
+            </a:r>
+            <a:r>
+              <a:rPr lang="en-US" sz="1400" dirty="0">
+                <a:solidFill>
+                  <a:srgbClr val="000000"/>
+                </a:solidFill>
+                <a:latin typeface="Monaco"/>
+                <a:ea typeface="Monaco"/>
+                <a:cs typeface="Monaco"/>
+              </a:rPr>
+              <a:t>)</a:t>
+            </a:r>
+          </a:p>
+          <a:p>
+            <a:r>
+              <a:rPr lang="en-US" sz="1400" dirty="0">
+                <a:solidFill>
+                  <a:srgbClr val="000000"/>
+                </a:solidFill>
+                <a:latin typeface="Monaco"/>
+                <a:ea typeface="Monaco"/>
+                <a:cs typeface="Monaco"/>
+              </a:rPr>
+              <a:t>  {</a:t>
+            </a:r>
+          </a:p>
+          <a:p>
+            <a:r>
+              <a:rPr lang="en-US" sz="1400" dirty="0">
+                <a:solidFill>
+                  <a:srgbClr val="000000"/>
+                </a:solidFill>
+                <a:latin typeface="Monaco"/>
+                <a:ea typeface="Monaco"/>
+                <a:cs typeface="Monaco"/>
+              </a:rPr>
+              <a:t>    total = </a:t>
+            </a:r>
+            <a:r>
+              <a:rPr lang="en-US" sz="1400" dirty="0" err="1">
+                <a:solidFill>
+                  <a:srgbClr val="000000"/>
+                </a:solidFill>
+                <a:latin typeface="Monaco"/>
+                <a:ea typeface="Monaco"/>
+                <a:cs typeface="Monaco"/>
+              </a:rPr>
+              <a:t>firstMortagePayment</a:t>
+            </a:r>
+            <a:r>
+              <a:rPr lang="en-US" sz="1400" dirty="0">
+                <a:solidFill>
+                  <a:srgbClr val="000000"/>
+                </a:solidFill>
+                <a:latin typeface="Monaco"/>
+                <a:ea typeface="Monaco"/>
+                <a:cs typeface="Monaco"/>
+              </a:rPr>
+              <a:t>;</a:t>
+            </a:r>
+          </a:p>
+          <a:p>
+            <a:r>
+              <a:rPr lang="en-US" sz="1400" dirty="0">
+                <a:solidFill>
+                  <a:srgbClr val="000000"/>
+                </a:solidFill>
+                <a:latin typeface="Monaco"/>
+                <a:ea typeface="Monaco"/>
+                <a:cs typeface="Monaco"/>
+              </a:rPr>
+              <a:t>  }</a:t>
+            </a:r>
+          </a:p>
+          <a:p>
+            <a:r>
+              <a:rPr lang="en-US" sz="1400" dirty="0">
+                <a:solidFill>
+                  <a:srgbClr val="000000"/>
+                </a:solidFill>
+                <a:latin typeface="Monaco"/>
+                <a:ea typeface="Monaco"/>
+                <a:cs typeface="Monaco"/>
+              </a:rPr>
+              <a:t>  </a:t>
+            </a:r>
+            <a:r>
+              <a:rPr lang="en-US" sz="1400" dirty="0">
+                <a:solidFill>
+                  <a:srgbClr val="931968"/>
+                </a:solidFill>
+                <a:latin typeface="Monaco"/>
+                <a:ea typeface="Monaco"/>
+                <a:cs typeface="Monaco"/>
+              </a:rPr>
+              <a:t>return</a:t>
+            </a:r>
+            <a:r>
+              <a:rPr lang="en-US" sz="1400" dirty="0">
+                <a:solidFill>
+                  <a:srgbClr val="000000"/>
+                </a:solidFill>
+                <a:latin typeface="Monaco"/>
+                <a:ea typeface="Monaco"/>
+                <a:cs typeface="Monaco"/>
+              </a:rPr>
+              <a:t> total;</a:t>
+            </a:r>
+          </a:p>
+          <a:p>
+            <a:r>
+              <a:rPr lang="en-US" sz="1400" dirty="0">
+                <a:solidFill>
+                  <a:srgbClr val="000000"/>
+                </a:solidFill>
+                <a:latin typeface="Monaco"/>
+                <a:ea typeface="Monaco"/>
+                <a:cs typeface="Monaco"/>
+              </a:rPr>
+              <a:t>}</a:t>
+            </a:r>
+            <a:endParaRPr lang="en-US" sz="1400" dirty="0"/>
+          </a:p>
+        </p:txBody>
+      </p:sp>
       <p:sp>
         <p:nvSpPr>
           <p:cNvPr id="14" name="Rectangle 2"/>
@@ -12797,8 +14077,8 @@
         </p:nvSpPr>
         <p:spPr bwMode="auto">
           <a:xfrm>
-            <a:off x="1564481" y="1734591"/>
-            <a:ext cx="4625578" cy="160734"/>
+            <a:off x="270294" y="1299179"/>
+            <a:ext cx="4924615" cy="230885"/>
           </a:xfrm>
           <a:prstGeom prst="rect">
             <a:avLst/>
@@ -12838,8 +14118,8 @@
         </p:nvSpPr>
         <p:spPr bwMode="auto">
           <a:xfrm>
-            <a:off x="1564481" y="1922114"/>
-            <a:ext cx="6143625" cy="160734"/>
+            <a:off x="270294" y="1547179"/>
+            <a:ext cx="7627902" cy="200600"/>
           </a:xfrm>
           <a:prstGeom prst="rect">
             <a:avLst/>
@@ -12879,8 +14159,8 @@
         </p:nvSpPr>
         <p:spPr bwMode="auto">
           <a:xfrm>
-            <a:off x="1564481" y="2102940"/>
-            <a:ext cx="6465094" cy="154037"/>
+            <a:off x="270294" y="1758243"/>
+            <a:ext cx="8655995" cy="213298"/>
           </a:xfrm>
           <a:prstGeom prst="rect">
             <a:avLst/>
@@ -14417,60 +15697,531 @@
           <a:chExt cx="0" cy="0"/>
         </a:xfrm>
       </p:grpSpPr>
-      <p:pic>
-        <p:nvPicPr>
-          <p:cNvPr id="6" name="Picture 1"/>
-          <p:cNvPicPr>
-            <a:picLocks noChangeAspect="1" noChangeArrowheads="1"/>
-          </p:cNvPicPr>
+      <p:sp>
+        <p:nvSpPr>
+          <p:cNvPr id="2" name="TextBox 1"/>
+          <p:cNvSpPr txBox="1"/>
           <p:nvPr/>
-        </p:nvPicPr>
-        <p:blipFill>
-          <a:blip r:embed="rId3">
-            <a:extLst>
-              <a:ext uri="{28A0092B-C50C-407E-A947-70E740481C1C}">
-                <a14:useLocalDpi xmlns:a14="http://schemas.microsoft.com/office/drawing/2010/main" val="0"/>
-              </a:ext>
-            </a:extLst>
-          </a:blip>
-          <a:srcRect/>
-          <a:stretch>
-            <a:fillRect/>
-          </a:stretch>
-        </p:blipFill>
-        <p:spPr bwMode="auto">
+        </p:nvSpPr>
+        <p:spPr>
           <a:xfrm>
-            <a:off x="1491853" y="1526976"/>
-            <a:ext cx="6000750" cy="2437805"/>
+            <a:off x="0" y="901095"/>
+            <a:ext cx="9144000" cy="3539430"/>
           </a:xfrm>
           <a:prstGeom prst="rect">
             <a:avLst/>
           </a:prstGeom>
           <a:noFill/>
-          <a:ln>
-            <a:noFill/>
-          </a:ln>
-          <a:extLst>
-            <a:ext uri="{909E8E84-426E-40dd-AFC4-6F175D3DCCD1}">
-              <a14:hiddenFill xmlns:a14="http://schemas.microsoft.com/office/drawing/2010/main">
-                <a:solidFill>
-                  <a:srgbClr val="FFFFFF"/>
-                </a:solidFill>
-              </a14:hiddenFill>
-            </a:ext>
-            <a:ext uri="{91240B29-F687-4f45-9708-019B960494DF}">
-              <a14:hiddenLine xmlns:a14="http://schemas.microsoft.com/office/drawing/2010/main" w="12700" cap="flat">
-                <a:solidFill>
-                  <a:schemeClr val="tx1"/>
-                </a:solidFill>
-                <a:round/>
-                <a:headEnd/>
-                <a:tailEnd/>
-              </a14:hiddenLine>
-            </a:ext>
-          </a:extLst>
         </p:spPr>
-      </p:pic>
+        <p:txBody>
+          <a:bodyPr wrap="square" rtlCol="0">
+            <a:spAutoFit/>
+          </a:bodyPr>
+          <a:lstStyle/>
+          <a:p>
+            <a:r>
+              <a:rPr lang="en-US" sz="1600" dirty="0">
+                <a:solidFill>
+                  <a:srgbClr val="931968"/>
+                </a:solidFill>
+                <a:latin typeface="Monaco"/>
+                <a:ea typeface="Monaco"/>
+                <a:cs typeface="Monaco"/>
+              </a:rPr>
+              <a:t>public</a:t>
+            </a:r>
+            <a:r>
+              <a:rPr lang="en-US" sz="1600" dirty="0">
+                <a:solidFill>
+                  <a:srgbClr val="000000"/>
+                </a:solidFill>
+                <a:latin typeface="Monaco"/>
+                <a:ea typeface="Monaco"/>
+                <a:cs typeface="Monaco"/>
+              </a:rPr>
+              <a:t> </a:t>
+            </a:r>
+            <a:r>
+              <a:rPr lang="en-US" sz="1600" dirty="0">
+                <a:solidFill>
+                  <a:srgbClr val="931968"/>
+                </a:solidFill>
+                <a:latin typeface="Monaco"/>
+                <a:ea typeface="Monaco"/>
+                <a:cs typeface="Monaco"/>
+              </a:rPr>
+              <a:t>void</a:t>
+            </a:r>
+            <a:r>
+              <a:rPr lang="en-US" sz="1600" dirty="0">
+                <a:solidFill>
+                  <a:srgbClr val="000000"/>
+                </a:solidFill>
+                <a:latin typeface="Monaco"/>
+                <a:ea typeface="Monaco"/>
+                <a:cs typeface="Monaco"/>
+              </a:rPr>
+              <a:t> </a:t>
+            </a:r>
+            <a:r>
+              <a:rPr lang="en-US" sz="1600" dirty="0" err="1">
+                <a:solidFill>
+                  <a:srgbClr val="000000"/>
+                </a:solidFill>
+                <a:latin typeface="Monaco"/>
+                <a:ea typeface="Monaco"/>
+                <a:cs typeface="Monaco"/>
+              </a:rPr>
+              <a:t>escalateProblems</a:t>
+            </a:r>
+            <a:r>
+              <a:rPr lang="en-US" sz="1600" dirty="0">
+                <a:solidFill>
+                  <a:srgbClr val="000000"/>
+                </a:solidFill>
+                <a:latin typeface="Monaco"/>
+                <a:ea typeface="Monaco"/>
+                <a:cs typeface="Monaco"/>
+              </a:rPr>
+              <a:t>(Loan[] loans, Connection conn)</a:t>
+            </a:r>
+          </a:p>
+          <a:p>
+            <a:r>
+              <a:rPr lang="en-US" sz="1600" dirty="0">
+                <a:solidFill>
+                  <a:srgbClr val="000000"/>
+                </a:solidFill>
+                <a:latin typeface="Monaco"/>
+                <a:ea typeface="Monaco"/>
+                <a:cs typeface="Monaco"/>
+              </a:rPr>
+              <a:t>{</a:t>
+            </a:r>
+          </a:p>
+          <a:p>
+            <a:r>
+              <a:rPr lang="en-US" sz="1600" dirty="0">
+                <a:solidFill>
+                  <a:srgbClr val="000000"/>
+                </a:solidFill>
+                <a:latin typeface="Monaco"/>
+                <a:ea typeface="Monaco"/>
+                <a:cs typeface="Monaco"/>
+              </a:rPr>
+              <a:t>  </a:t>
+            </a:r>
+            <a:r>
+              <a:rPr lang="en-US" sz="1600" dirty="0">
+                <a:solidFill>
+                  <a:srgbClr val="931968"/>
+                </a:solidFill>
+                <a:latin typeface="Monaco"/>
+                <a:ea typeface="Monaco"/>
+                <a:cs typeface="Monaco"/>
+              </a:rPr>
+              <a:t>for</a:t>
+            </a:r>
+            <a:r>
+              <a:rPr lang="en-US" sz="1600" dirty="0">
+                <a:solidFill>
+                  <a:srgbClr val="000000"/>
+                </a:solidFill>
+                <a:latin typeface="Monaco"/>
+                <a:ea typeface="Monaco"/>
+                <a:cs typeface="Monaco"/>
+              </a:rPr>
+              <a:t> (Loan loan : loans)</a:t>
+            </a:r>
+          </a:p>
+          <a:p>
+            <a:r>
+              <a:rPr lang="en-US" sz="1600" dirty="0">
+                <a:solidFill>
+                  <a:srgbClr val="000000"/>
+                </a:solidFill>
+                <a:latin typeface="Monaco"/>
+                <a:ea typeface="Monaco"/>
+                <a:cs typeface="Monaco"/>
+              </a:rPr>
+              <a:t>  {</a:t>
+            </a:r>
+          </a:p>
+          <a:p>
+            <a:r>
+              <a:rPr lang="en-US" sz="1600" dirty="0">
+                <a:solidFill>
+                  <a:srgbClr val="000000"/>
+                </a:solidFill>
+                <a:latin typeface="Monaco"/>
+                <a:ea typeface="Monaco"/>
+                <a:cs typeface="Monaco"/>
+              </a:rPr>
+              <a:t>    </a:t>
+            </a:r>
+            <a:r>
+              <a:rPr lang="en-US" sz="1600" dirty="0">
+                <a:solidFill>
+                  <a:srgbClr val="931968"/>
+                </a:solidFill>
+                <a:latin typeface="Monaco"/>
+                <a:ea typeface="Monaco"/>
+                <a:cs typeface="Monaco"/>
+              </a:rPr>
+              <a:t>if</a:t>
+            </a:r>
+            <a:r>
+              <a:rPr lang="en-US" sz="1600" dirty="0">
+                <a:solidFill>
+                  <a:srgbClr val="000000"/>
+                </a:solidFill>
+                <a:latin typeface="Monaco"/>
+                <a:ea typeface="Monaco"/>
+                <a:cs typeface="Monaco"/>
+              </a:rPr>
+              <a:t> (</a:t>
+            </a:r>
+            <a:r>
+              <a:rPr lang="en-US" sz="1600" dirty="0" err="1">
+                <a:solidFill>
+                  <a:srgbClr val="000000"/>
+                </a:solidFill>
+                <a:latin typeface="Monaco"/>
+                <a:ea typeface="Monaco"/>
+                <a:cs typeface="Monaco"/>
+              </a:rPr>
+              <a:t>loan.isOverDue</a:t>
+            </a:r>
+            <a:r>
+              <a:rPr lang="en-US" sz="1600" dirty="0">
+                <a:solidFill>
+                  <a:srgbClr val="000000"/>
+                </a:solidFill>
+                <a:latin typeface="Monaco"/>
+                <a:ea typeface="Monaco"/>
+                <a:cs typeface="Monaco"/>
+              </a:rPr>
+              <a:t>() &amp;&amp; (</a:t>
+            </a:r>
+            <a:r>
+              <a:rPr lang="en-US" sz="1600" dirty="0" err="1">
+                <a:solidFill>
+                  <a:srgbClr val="000000"/>
+                </a:solidFill>
+                <a:latin typeface="Monaco"/>
+                <a:ea typeface="Monaco"/>
+                <a:cs typeface="Monaco"/>
+              </a:rPr>
+              <a:t>loan.getAmount</a:t>
+            </a:r>
+            <a:r>
+              <a:rPr lang="en-US" sz="1600" dirty="0">
+                <a:solidFill>
+                  <a:srgbClr val="000000"/>
+                </a:solidFill>
+                <a:latin typeface="Monaco"/>
+                <a:ea typeface="Monaco"/>
+                <a:cs typeface="Monaco"/>
+              </a:rPr>
+              <a:t>() &gt; 5000))</a:t>
+            </a:r>
+          </a:p>
+          <a:p>
+            <a:r>
+              <a:rPr lang="en-US" sz="1600" dirty="0">
+                <a:solidFill>
+                  <a:srgbClr val="000000"/>
+                </a:solidFill>
+                <a:latin typeface="Monaco"/>
+                <a:ea typeface="Monaco"/>
+                <a:cs typeface="Monaco"/>
+              </a:rPr>
+              <a:t>    {</a:t>
+            </a:r>
+          </a:p>
+          <a:p>
+            <a:r>
+              <a:rPr lang="en-US" sz="1600" dirty="0">
+                <a:solidFill>
+                  <a:srgbClr val="000000"/>
+                </a:solidFill>
+                <a:latin typeface="Monaco"/>
+                <a:ea typeface="Monaco"/>
+                <a:cs typeface="Monaco"/>
+              </a:rPr>
+              <a:t>      </a:t>
+            </a:r>
+            <a:r>
+              <a:rPr lang="en-US" sz="1600" dirty="0" err="1">
+                <a:solidFill>
+                  <a:srgbClr val="000000"/>
+                </a:solidFill>
+                <a:latin typeface="Monaco"/>
+                <a:ea typeface="Monaco"/>
+                <a:cs typeface="Monaco"/>
+              </a:rPr>
+              <a:t>loan.saveStatus</a:t>
+            </a:r>
+            <a:r>
+              <a:rPr lang="en-US" sz="1600" dirty="0">
+                <a:solidFill>
+                  <a:srgbClr val="000000"/>
+                </a:solidFill>
+                <a:latin typeface="Monaco"/>
+                <a:ea typeface="Monaco"/>
+                <a:cs typeface="Monaco"/>
+              </a:rPr>
+              <a:t>(</a:t>
+            </a:r>
+            <a:r>
+              <a:rPr lang="en-US" sz="1600" dirty="0">
+                <a:solidFill>
+                  <a:srgbClr val="3933FF"/>
+                </a:solidFill>
+                <a:latin typeface="Monaco"/>
+                <a:ea typeface="Monaco"/>
+                <a:cs typeface="Monaco"/>
+              </a:rPr>
+              <a:t>"Critical"</a:t>
+            </a:r>
+            <a:r>
+              <a:rPr lang="en-US" sz="1600" dirty="0">
+                <a:solidFill>
+                  <a:srgbClr val="000000"/>
+                </a:solidFill>
+                <a:latin typeface="Monaco"/>
+                <a:ea typeface="Monaco"/>
+                <a:cs typeface="Monaco"/>
+              </a:rPr>
+              <a:t>, conn);</a:t>
+            </a:r>
+          </a:p>
+          <a:p>
+            <a:r>
+              <a:rPr lang="en-US" sz="1600" dirty="0">
+                <a:solidFill>
+                  <a:srgbClr val="000000"/>
+                </a:solidFill>
+                <a:latin typeface="Monaco"/>
+                <a:ea typeface="Monaco"/>
+                <a:cs typeface="Monaco"/>
+              </a:rPr>
+              <a:t>    }</a:t>
+            </a:r>
+          </a:p>
+          <a:p>
+            <a:r>
+              <a:rPr lang="en-US" sz="1600" dirty="0">
+                <a:solidFill>
+                  <a:srgbClr val="000000"/>
+                </a:solidFill>
+                <a:latin typeface="Monaco"/>
+                <a:ea typeface="Monaco"/>
+                <a:cs typeface="Monaco"/>
+              </a:rPr>
+              <a:t>    </a:t>
+            </a:r>
+            <a:r>
+              <a:rPr lang="en-US" sz="1600" dirty="0">
+                <a:solidFill>
+                  <a:srgbClr val="931968"/>
+                </a:solidFill>
+                <a:latin typeface="Monaco"/>
+                <a:ea typeface="Monaco"/>
+                <a:cs typeface="Monaco"/>
+              </a:rPr>
+              <a:t>else</a:t>
+            </a:r>
+            <a:r>
+              <a:rPr lang="en-US" sz="1600" dirty="0">
+                <a:solidFill>
+                  <a:srgbClr val="000000"/>
+                </a:solidFill>
+                <a:latin typeface="Monaco"/>
+                <a:ea typeface="Monaco"/>
+                <a:cs typeface="Monaco"/>
+              </a:rPr>
+              <a:t> </a:t>
+            </a:r>
+            <a:r>
+              <a:rPr lang="en-US" sz="1600" dirty="0">
+                <a:solidFill>
+                  <a:srgbClr val="931968"/>
+                </a:solidFill>
+                <a:latin typeface="Monaco"/>
+                <a:ea typeface="Monaco"/>
+                <a:cs typeface="Monaco"/>
+              </a:rPr>
+              <a:t>if</a:t>
+            </a:r>
+            <a:r>
+              <a:rPr lang="en-US" sz="1600" dirty="0">
+                <a:solidFill>
+                  <a:srgbClr val="000000"/>
+                </a:solidFill>
+                <a:latin typeface="Monaco"/>
+                <a:ea typeface="Monaco"/>
+                <a:cs typeface="Monaco"/>
+              </a:rPr>
+              <a:t> (</a:t>
+            </a:r>
+            <a:r>
+              <a:rPr lang="en-US" sz="1600" dirty="0" err="1">
+                <a:solidFill>
+                  <a:srgbClr val="000000"/>
+                </a:solidFill>
+                <a:latin typeface="Monaco"/>
+                <a:ea typeface="Monaco"/>
+                <a:cs typeface="Monaco"/>
+              </a:rPr>
+              <a:t>loan.isOverDue</a:t>
+            </a:r>
+            <a:r>
+              <a:rPr lang="en-US" sz="1600" dirty="0">
+                <a:solidFill>
+                  <a:srgbClr val="000000"/>
+                </a:solidFill>
+                <a:latin typeface="Monaco"/>
+                <a:ea typeface="Monaco"/>
+                <a:cs typeface="Monaco"/>
+              </a:rPr>
+              <a:t>() &amp;&amp; (</a:t>
+            </a:r>
+            <a:r>
+              <a:rPr lang="en-US" sz="1600" dirty="0" err="1">
+                <a:solidFill>
+                  <a:srgbClr val="000000"/>
+                </a:solidFill>
+                <a:latin typeface="Monaco"/>
+                <a:ea typeface="Monaco"/>
+                <a:cs typeface="Monaco"/>
+              </a:rPr>
+              <a:t>loan.getAmount</a:t>
+            </a:r>
+            <a:r>
+              <a:rPr lang="en-US" sz="1600" dirty="0">
+                <a:solidFill>
+                  <a:srgbClr val="000000"/>
+                </a:solidFill>
+                <a:latin typeface="Monaco"/>
+                <a:ea typeface="Monaco"/>
+                <a:cs typeface="Monaco"/>
+              </a:rPr>
+              <a:t>() &gt; 50))</a:t>
+            </a:r>
+          </a:p>
+          <a:p>
+            <a:r>
+              <a:rPr lang="en-US" sz="1600" dirty="0">
+                <a:solidFill>
+                  <a:srgbClr val="000000"/>
+                </a:solidFill>
+                <a:latin typeface="Monaco"/>
+                <a:ea typeface="Monaco"/>
+                <a:cs typeface="Monaco"/>
+              </a:rPr>
+              <a:t>    {</a:t>
+            </a:r>
+          </a:p>
+          <a:p>
+            <a:r>
+              <a:rPr lang="en-US" sz="1600" dirty="0">
+                <a:solidFill>
+                  <a:srgbClr val="000000"/>
+                </a:solidFill>
+                <a:latin typeface="Monaco"/>
+                <a:ea typeface="Monaco"/>
+                <a:cs typeface="Monaco"/>
+              </a:rPr>
+              <a:t>      </a:t>
+            </a:r>
+            <a:r>
+              <a:rPr lang="en-US" sz="1600" dirty="0" err="1">
+                <a:solidFill>
+                  <a:srgbClr val="000000"/>
+                </a:solidFill>
+                <a:latin typeface="Monaco"/>
+                <a:ea typeface="Monaco"/>
+                <a:cs typeface="Monaco"/>
+              </a:rPr>
+              <a:t>loan.saveStatus</a:t>
+            </a:r>
+            <a:r>
+              <a:rPr lang="en-US" sz="1600" dirty="0">
+                <a:solidFill>
+                  <a:srgbClr val="000000"/>
+                </a:solidFill>
+                <a:latin typeface="Monaco"/>
+                <a:ea typeface="Monaco"/>
+                <a:cs typeface="Monaco"/>
+              </a:rPr>
+              <a:t>(</a:t>
+            </a:r>
+            <a:r>
+              <a:rPr lang="en-US" sz="1600" dirty="0">
+                <a:solidFill>
+                  <a:srgbClr val="3933FF"/>
+                </a:solidFill>
+                <a:latin typeface="Monaco"/>
+                <a:ea typeface="Monaco"/>
+                <a:cs typeface="Monaco"/>
+              </a:rPr>
+              <a:t>"Escalated"</a:t>
+            </a:r>
+            <a:r>
+              <a:rPr lang="en-US" sz="1600" dirty="0">
+                <a:solidFill>
+                  <a:srgbClr val="000000"/>
+                </a:solidFill>
+                <a:latin typeface="Monaco"/>
+                <a:ea typeface="Monaco"/>
+                <a:cs typeface="Monaco"/>
+              </a:rPr>
+              <a:t>, conn);</a:t>
+            </a:r>
+          </a:p>
+          <a:p>
+            <a:r>
+              <a:rPr lang="en-US" sz="1600" dirty="0">
+                <a:solidFill>
+                  <a:srgbClr val="000000"/>
+                </a:solidFill>
+                <a:latin typeface="Monaco"/>
+                <a:ea typeface="Monaco"/>
+                <a:cs typeface="Monaco"/>
+              </a:rPr>
+              <a:t>    }</a:t>
+            </a:r>
+          </a:p>
+          <a:p>
+            <a:r>
+              <a:rPr lang="en-US" sz="1600" dirty="0">
+                <a:solidFill>
+                  <a:srgbClr val="000000"/>
+                </a:solidFill>
+                <a:latin typeface="Monaco"/>
+                <a:ea typeface="Monaco"/>
+                <a:cs typeface="Monaco"/>
+              </a:rPr>
+              <a:t>  }</a:t>
+            </a:r>
+          </a:p>
+          <a:p>
+            <a:r>
+              <a:rPr lang="en-US" sz="1600" dirty="0">
+                <a:solidFill>
+                  <a:srgbClr val="000000"/>
+                </a:solidFill>
+                <a:latin typeface="Monaco"/>
+                <a:ea typeface="Monaco"/>
+                <a:cs typeface="Monaco"/>
+              </a:rPr>
+              <a:t>}</a:t>
+            </a:r>
+            <a:endParaRPr lang="en-US" sz="1600" dirty="0"/>
+          </a:p>
+        </p:txBody>
+      </p:sp>
       <p:sp>
         <p:nvSpPr>
           <p:cNvPr id="7" name="Rectangle 2"/>
@@ -14481,8 +16232,8 @@
         </p:nvSpPr>
         <p:spPr bwMode="auto">
           <a:xfrm>
-            <a:off x="2652713" y="2223492"/>
-            <a:ext cx="1535906" cy="180826"/>
+            <a:off x="1047515" y="1929190"/>
+            <a:ext cx="1979961" cy="239271"/>
           </a:xfrm>
           <a:prstGeom prst="rect">
             <a:avLst/>
@@ -14522,8 +16273,8 @@
         </p:nvSpPr>
         <p:spPr bwMode="auto">
           <a:xfrm>
-            <a:off x="4670822" y="2223492"/>
-            <a:ext cx="1535906" cy="180826"/>
+            <a:off x="3652243" y="1929190"/>
+            <a:ext cx="1979961" cy="239271"/>
           </a:xfrm>
           <a:prstGeom prst="rect">
             <a:avLst/>
@@ -14563,8 +16314,8 @@
         </p:nvSpPr>
         <p:spPr bwMode="auto">
           <a:xfrm>
-            <a:off x="2652712" y="2565053"/>
-            <a:ext cx="3178969" cy="180826"/>
+            <a:off x="838574" y="2427988"/>
+            <a:ext cx="4098060" cy="239271"/>
           </a:xfrm>
           <a:prstGeom prst="rect">
             <a:avLst/>
@@ -14590,7 +16341,7 @@
           <a:bodyPr lIns="0" tIns="0" rIns="0" bIns="0"/>
           <a:lstStyle/>
           <a:p>
-            <a:endParaRPr lang="en-US"/>
+            <a:endParaRPr lang="en-US" dirty="0"/>
           </a:p>
         </p:txBody>
       </p:sp>
@@ -14604,8 +16355,8 @@
         </p:nvSpPr>
         <p:spPr bwMode="auto">
           <a:xfrm>
-            <a:off x="3134916" y="2906613"/>
-            <a:ext cx="1535906" cy="180826"/>
+            <a:off x="1680908" y="2914692"/>
+            <a:ext cx="1979961" cy="239271"/>
           </a:xfrm>
           <a:prstGeom prst="rect">
             <a:avLst/>
@@ -14645,8 +16396,8 @@
         </p:nvSpPr>
         <p:spPr bwMode="auto">
           <a:xfrm>
-            <a:off x="5153025" y="2906613"/>
-            <a:ext cx="1535906" cy="180826"/>
+            <a:off x="4231208" y="2908644"/>
+            <a:ext cx="1979961" cy="239271"/>
           </a:xfrm>
           <a:prstGeom prst="rect">
             <a:avLst/>
@@ -14686,8 +16437,8 @@
         </p:nvSpPr>
         <p:spPr bwMode="auto">
           <a:xfrm>
-            <a:off x="2652712" y="3248174"/>
-            <a:ext cx="3268266" cy="180826"/>
+            <a:off x="812756" y="3395348"/>
+            <a:ext cx="4213174" cy="239271"/>
           </a:xfrm>
           <a:prstGeom prst="rect">
             <a:avLst/>
@@ -14727,8 +16478,8 @@
         </p:nvSpPr>
         <p:spPr bwMode="auto">
           <a:xfrm>
-            <a:off x="2652712" y="2223492"/>
-            <a:ext cx="410766" cy="180826"/>
+            <a:off x="1040191" y="1929190"/>
+            <a:ext cx="529525" cy="239271"/>
           </a:xfrm>
           <a:prstGeom prst="rect">
             <a:avLst/>
@@ -14768,8 +16519,8 @@
         </p:nvSpPr>
         <p:spPr bwMode="auto">
           <a:xfrm>
-            <a:off x="4670822" y="2223492"/>
-            <a:ext cx="410766" cy="180826"/>
+            <a:off x="3650967" y="1929190"/>
+            <a:ext cx="529525" cy="239271"/>
           </a:xfrm>
           <a:prstGeom prst="rect">
             <a:avLst/>
@@ -14809,8 +16560,8 @@
         </p:nvSpPr>
         <p:spPr bwMode="auto">
           <a:xfrm>
-            <a:off x="2652712" y="2565053"/>
-            <a:ext cx="410766" cy="180826"/>
+            <a:off x="840619" y="2415894"/>
+            <a:ext cx="529525" cy="239271"/>
           </a:xfrm>
           <a:prstGeom prst="rect">
             <a:avLst/>
@@ -14850,8 +16601,8 @@
         </p:nvSpPr>
         <p:spPr bwMode="auto">
           <a:xfrm>
-            <a:off x="3143845" y="2906613"/>
-            <a:ext cx="410766" cy="180826"/>
+            <a:off x="1676467" y="2914692"/>
+            <a:ext cx="529525" cy="239271"/>
           </a:xfrm>
           <a:prstGeom prst="rect">
             <a:avLst/>
@@ -14891,8 +16642,8 @@
         </p:nvSpPr>
         <p:spPr bwMode="auto">
           <a:xfrm>
-            <a:off x="5161955" y="2906613"/>
-            <a:ext cx="410766" cy="180826"/>
+            <a:off x="4232815" y="2908644"/>
+            <a:ext cx="529525" cy="239271"/>
           </a:xfrm>
           <a:prstGeom prst="rect">
             <a:avLst/>
@@ -14932,8 +16683,8 @@
         </p:nvSpPr>
         <p:spPr bwMode="auto">
           <a:xfrm>
-            <a:off x="2652712" y="3248174"/>
-            <a:ext cx="410766" cy="180826"/>
+            <a:off x="810382" y="3401396"/>
+            <a:ext cx="529525" cy="239271"/>
           </a:xfrm>
           <a:prstGeom prst="rect">
             <a:avLst/>

</xml_diff>